<commit_message>
chnages in pom lombok
</commit_message>
<xml_diff>
--- a/src/test/resources/presa.pptx
+++ b/src/test/resources/presa.pptx
@@ -3495,7 +3495,7 @@
           </a:ln>
           <a:extLst>
             <a:ext uri="{C572A759-6A51-4108-AA02-DFA0A04FC94B}">
-              <ma14:wrappingTextBoxFlag xmlns:ma14="http://schemas.microsoft.com/office/mac/drawingml/2011/main" xmlns:a14="http://schemas.microsoft.com/office/drawing/2010/main" xmlns:m="http://schemas.openxmlformats.org/officeDocument/2006/math" xmlns="" val="1"/>
+              <ma14:wrappingTextBoxFlag xmlns="" xmlns:m="http://schemas.openxmlformats.org/officeDocument/2006/math" xmlns:a14="http://schemas.microsoft.com/office/drawing/2010/main" xmlns:ma14="http://schemas.microsoft.com/office/mac/drawingml/2011/main" val="1"/>
             </a:ext>
           </a:extLst>
         </p:spPr>
@@ -3534,7 +3534,7 @@
           </a:ln>
           <a:extLst>
             <a:ext uri="{C572A759-6A51-4108-AA02-DFA0A04FC94B}">
-              <ma14:wrappingTextBoxFlag xmlns:ma14="http://schemas.microsoft.com/office/mac/drawingml/2011/main" xmlns:a14="http://schemas.microsoft.com/office/drawing/2010/main" xmlns:m="http://schemas.openxmlformats.org/officeDocument/2006/math" xmlns="" val="1"/>
+              <ma14:wrappingTextBoxFlag xmlns="" xmlns:m="http://schemas.openxmlformats.org/officeDocument/2006/math" xmlns:a14="http://schemas.microsoft.com/office/drawing/2010/main" xmlns:ma14="http://schemas.microsoft.com/office/mac/drawingml/2011/main" val="1"/>
             </a:ext>
           </a:extLst>
         </p:spPr>
@@ -4585,44 +4585,140 @@
           <a:bodyPr/>
           <a:lstStyle/>
           <a:p>
-            <a:endParaRPr/>
+            <a:r>
+              <a:rPr lang="en-US" dirty="0"/>
+              <a:t>Jenkins</a:t>
+            </a:r>
+            <a:endParaRPr dirty="0"/>
           </a:p>
         </p:txBody>
       </p:sp>
-      <p:sp>
-        <p:nvSpPr>
-          <p:cNvPr id="190" name="Google Shape;239;p17"/>
-          <p:cNvSpPr txBox="1">
-            <a:spLocks noGrp="1"/>
-          </p:cNvSpPr>
-          <p:nvPr>
-            <p:ph type="body" idx="1"/>
-          </p:nvPr>
-        </p:nvSpPr>
-        <p:spPr>
-          <a:prstGeom prst="rect">
-            <a:avLst/>
-          </a:prstGeom>
-        </p:spPr>
-        <p:txBody>
-          <a:bodyPr/>
-          <a:lstStyle/>
-          <a:p>
-            <a:pPr marL="160528" indent="-160528" defTabSz="1926287">
-              <a:spcBef>
-                <a:spcPts val="3500"/>
-              </a:spcBef>
-              <a:defRPr sz="3792" b="1"/>
-            </a:pPr>
-            <a:endParaRPr sz="3160" dirty="0">
-              <a:latin typeface="Calibri"/>
-              <a:ea typeface="Calibri"/>
-              <a:cs typeface="Calibri"/>
-              <a:sym typeface="Calibri"/>
-            </a:endParaRPr>
-          </a:p>
-        </p:txBody>
-      </p:sp>
+      <p:pic>
+        <p:nvPicPr>
+          <p:cNvPr id="5" name="Рисунок 4">
+            <a:extLst>
+              <a:ext uri="{FF2B5EF4-FFF2-40B4-BE49-F238E27FC236}">
+                <a16:creationId xmlns:a16="http://schemas.microsoft.com/office/drawing/2014/main" id="{F9CE2350-AF80-90CA-8D4F-62AB89FAB617}"/>
+              </a:ext>
+            </a:extLst>
+          </p:cNvPr>
+          <p:cNvPicPr>
+            <a:picLocks noChangeAspect="1"/>
+          </p:cNvPicPr>
+          <p:nvPr/>
+        </p:nvPicPr>
+        <p:blipFill>
+          <a:blip r:embed="rId2"/>
+          <a:stretch>
+            <a:fillRect/>
+          </a:stretch>
+        </p:blipFill>
+        <p:spPr>
+          <a:xfrm>
+            <a:off x="626751" y="5028739"/>
+            <a:ext cx="7872726" cy="3658522"/>
+          </a:xfrm>
+          <a:prstGeom prst="rect">
+            <a:avLst/>
+          </a:prstGeom>
+          <a:ln w="228600" cap="sq" cmpd="thickThin">
+            <a:solidFill>
+              <a:srgbClr val="FFC000"/>
+            </a:solidFill>
+            <a:prstDash val="solid"/>
+            <a:miter lim="800000"/>
+          </a:ln>
+          <a:effectLst>
+            <a:innerShdw blurRad="76200">
+              <a:srgbClr val="000000"/>
+            </a:innerShdw>
+          </a:effectLst>
+        </p:spPr>
+      </p:pic>
+      <p:pic>
+        <p:nvPicPr>
+          <p:cNvPr id="9" name="Рисунок 8">
+            <a:extLst>
+              <a:ext uri="{FF2B5EF4-FFF2-40B4-BE49-F238E27FC236}">
+                <a16:creationId xmlns:a16="http://schemas.microsoft.com/office/drawing/2014/main" id="{29E9CF3B-7993-D467-03B8-ED478F14ACE1}"/>
+              </a:ext>
+            </a:extLst>
+          </p:cNvPr>
+          <p:cNvPicPr>
+            <a:picLocks noChangeAspect="1"/>
+          </p:cNvPicPr>
+          <p:nvPr/>
+        </p:nvPicPr>
+        <p:blipFill>
+          <a:blip r:embed="rId3"/>
+          <a:stretch>
+            <a:fillRect/>
+          </a:stretch>
+        </p:blipFill>
+        <p:spPr>
+          <a:xfrm>
+            <a:off x="18333176" y="5028739"/>
+            <a:ext cx="4328732" cy="8402831"/>
+          </a:xfrm>
+          <a:prstGeom prst="rect">
+            <a:avLst/>
+          </a:prstGeom>
+          <a:ln w="228600" cap="sq" cmpd="thickThin">
+            <a:solidFill>
+              <a:srgbClr val="FFC000"/>
+            </a:solidFill>
+            <a:prstDash val="solid"/>
+            <a:miter lim="800000"/>
+          </a:ln>
+          <a:effectLst>
+            <a:innerShdw blurRad="76200">
+              <a:srgbClr val="000000"/>
+            </a:innerShdw>
+          </a:effectLst>
+        </p:spPr>
+      </p:pic>
+      <p:pic>
+        <p:nvPicPr>
+          <p:cNvPr id="7" name="Рисунок 6">
+            <a:extLst>
+              <a:ext uri="{FF2B5EF4-FFF2-40B4-BE49-F238E27FC236}">
+                <a16:creationId xmlns:a16="http://schemas.microsoft.com/office/drawing/2014/main" id="{6EDA71DB-1E38-3D4B-AF4E-0236E44897C5}"/>
+              </a:ext>
+            </a:extLst>
+          </p:cNvPr>
+          <p:cNvPicPr>
+            <a:picLocks noChangeAspect="1"/>
+          </p:cNvPicPr>
+          <p:nvPr/>
+        </p:nvPicPr>
+        <p:blipFill>
+          <a:blip r:embed="rId4"/>
+          <a:stretch>
+            <a:fillRect/>
+          </a:stretch>
+        </p:blipFill>
+        <p:spPr>
+          <a:xfrm>
+            <a:off x="576330" y="9273669"/>
+            <a:ext cx="15846294" cy="4210638"/>
+          </a:xfrm>
+          <a:prstGeom prst="rect">
+            <a:avLst/>
+          </a:prstGeom>
+          <a:ln w="228600" cap="sq" cmpd="thickThin">
+            <a:solidFill>
+              <a:srgbClr val="FFC000"/>
+            </a:solidFill>
+            <a:prstDash val="solid"/>
+            <a:miter lim="800000"/>
+          </a:ln>
+          <a:effectLst>
+            <a:innerShdw blurRad="76200">
+              <a:srgbClr val="000000"/>
+            </a:innerShdw>
+          </a:effectLst>
+        </p:spPr>
+      </p:pic>
     </p:spTree>
   </p:cSld>
   <p:clrMapOvr>
@@ -4699,50 +4795,182 @@
           <a:bodyPr/>
           <a:lstStyle/>
           <a:p>
-            <a:endParaRPr/>
+            <a:r>
+              <a:rPr lang="en-US" dirty="0"/>
+              <a:t>Allure overview</a:t>
+            </a:r>
+            <a:endParaRPr dirty="0"/>
           </a:p>
         </p:txBody>
       </p:sp>
-      <p:sp>
-        <p:nvSpPr>
-          <p:cNvPr id="194" name="Google Shape;131;p6"/>
-          <p:cNvSpPr txBox="1">
-            <a:spLocks noGrp="1"/>
-          </p:cNvSpPr>
-          <p:nvPr>
-            <p:ph type="body" idx="1"/>
-          </p:nvPr>
-        </p:nvSpPr>
-        <p:spPr>
-          <a:prstGeom prst="rect">
-            <a:avLst/>
-          </a:prstGeom>
-        </p:spPr>
-        <p:txBody>
-          <a:bodyPr/>
-          <a:lstStyle/>
-          <a:p>
-            <a:pPr defTabSz="365760">
-              <a:lnSpc>
-                <a:spcPct val="100000"/>
-              </a:lnSpc>
-              <a:spcBef>
-                <a:spcPts val="0"/>
-              </a:spcBef>
-              <a:defRPr sz="3840">
-                <a:solidFill>
-                  <a:srgbClr val="202122"/>
-                </a:solidFill>
-                <a:latin typeface="Calibri"/>
-                <a:ea typeface="Calibri"/>
-                <a:cs typeface="Calibri"/>
-                <a:sym typeface="Calibri"/>
-              </a:defRPr>
-            </a:pPr>
-            <a:endParaRPr dirty="0"/>
-          </a:p>
-        </p:txBody>
-      </p:sp>
+      <p:pic>
+        <p:nvPicPr>
+          <p:cNvPr id="5" name="Рисунок 4">
+            <a:extLst>
+              <a:ext uri="{FF2B5EF4-FFF2-40B4-BE49-F238E27FC236}">
+                <a16:creationId xmlns:a16="http://schemas.microsoft.com/office/drawing/2014/main" id="{428C3F81-06F4-308C-F02D-878205033FF9}"/>
+              </a:ext>
+            </a:extLst>
+          </p:cNvPr>
+          <p:cNvPicPr>
+            <a:picLocks noChangeAspect="1"/>
+          </p:cNvPicPr>
+          <p:nvPr/>
+        </p:nvPicPr>
+        <p:blipFill>
+          <a:blip r:embed="rId2"/>
+          <a:stretch>
+            <a:fillRect/>
+          </a:stretch>
+        </p:blipFill>
+        <p:spPr>
+          <a:xfrm>
+            <a:off x="525083" y="4992564"/>
+            <a:ext cx="9983593" cy="6249272"/>
+          </a:xfrm>
+          <a:prstGeom prst="rect">
+            <a:avLst/>
+          </a:prstGeom>
+          <a:ln w="228600" cap="sq" cmpd="thickThin">
+            <a:solidFill>
+              <a:srgbClr val="FFC000"/>
+            </a:solidFill>
+            <a:prstDash val="solid"/>
+            <a:miter lim="800000"/>
+          </a:ln>
+          <a:effectLst>
+            <a:innerShdw blurRad="76200">
+              <a:srgbClr val="000000"/>
+            </a:innerShdw>
+          </a:effectLst>
+        </p:spPr>
+      </p:pic>
+      <p:pic>
+        <p:nvPicPr>
+          <p:cNvPr id="7" name="Рисунок 6">
+            <a:extLst>
+              <a:ext uri="{FF2B5EF4-FFF2-40B4-BE49-F238E27FC236}">
+                <a16:creationId xmlns:a16="http://schemas.microsoft.com/office/drawing/2014/main" id="{CBEE7BD3-37F1-2003-4230-5059401F52BA}"/>
+              </a:ext>
+            </a:extLst>
+          </p:cNvPr>
+          <p:cNvPicPr>
+            <a:picLocks noChangeAspect="1"/>
+          </p:cNvPicPr>
+          <p:nvPr/>
+        </p:nvPicPr>
+        <p:blipFill>
+          <a:blip r:embed="rId3"/>
+          <a:stretch>
+            <a:fillRect/>
+          </a:stretch>
+        </p:blipFill>
+        <p:spPr>
+          <a:xfrm>
+            <a:off x="3501517" y="8693463"/>
+            <a:ext cx="9245219" cy="4826288"/>
+          </a:xfrm>
+          <a:prstGeom prst="rect">
+            <a:avLst/>
+          </a:prstGeom>
+          <a:ln w="228600" cap="sq" cmpd="thickThin">
+            <a:solidFill>
+              <a:srgbClr val="FFC000"/>
+            </a:solidFill>
+            <a:prstDash val="solid"/>
+            <a:miter lim="800000"/>
+          </a:ln>
+          <a:effectLst>
+            <a:innerShdw blurRad="76200">
+              <a:srgbClr val="000000"/>
+            </a:innerShdw>
+          </a:effectLst>
+        </p:spPr>
+      </p:pic>
+      <p:pic>
+        <p:nvPicPr>
+          <p:cNvPr id="11" name="Рисунок 10">
+            <a:extLst>
+              <a:ext uri="{FF2B5EF4-FFF2-40B4-BE49-F238E27FC236}">
+                <a16:creationId xmlns:a16="http://schemas.microsoft.com/office/drawing/2014/main" id="{F1D1F471-C7E2-FA54-E1BE-C796989F73AC}"/>
+              </a:ext>
+            </a:extLst>
+          </p:cNvPr>
+          <p:cNvPicPr>
+            <a:picLocks noChangeAspect="1"/>
+          </p:cNvPicPr>
+          <p:nvPr/>
+        </p:nvPicPr>
+        <p:blipFill>
+          <a:blip r:embed="rId4"/>
+          <a:stretch>
+            <a:fillRect/>
+          </a:stretch>
+        </p:blipFill>
+        <p:spPr>
+          <a:xfrm>
+            <a:off x="14113482" y="4992564"/>
+            <a:ext cx="9745435" cy="6573167"/>
+          </a:xfrm>
+          <a:prstGeom prst="rect">
+            <a:avLst/>
+          </a:prstGeom>
+          <a:ln w="228600" cap="sq" cmpd="thickThin">
+            <a:solidFill>
+              <a:srgbClr val="FFC000"/>
+            </a:solidFill>
+            <a:prstDash val="solid"/>
+            <a:miter lim="800000"/>
+          </a:ln>
+          <a:effectLst>
+            <a:innerShdw blurRad="76200">
+              <a:srgbClr val="000000"/>
+            </a:innerShdw>
+          </a:effectLst>
+        </p:spPr>
+      </p:pic>
+      <p:pic>
+        <p:nvPicPr>
+          <p:cNvPr id="13" name="Рисунок 12">
+            <a:extLst>
+              <a:ext uri="{FF2B5EF4-FFF2-40B4-BE49-F238E27FC236}">
+                <a16:creationId xmlns:a16="http://schemas.microsoft.com/office/drawing/2014/main" id="{2E476E54-2CE6-FC4E-1397-F9FB14F43A93}"/>
+              </a:ext>
+            </a:extLst>
+          </p:cNvPr>
+          <p:cNvPicPr>
+            <a:picLocks noChangeAspect="1"/>
+          </p:cNvPicPr>
+          <p:nvPr/>
+        </p:nvPicPr>
+        <p:blipFill>
+          <a:blip r:embed="rId5"/>
+          <a:stretch>
+            <a:fillRect/>
+          </a:stretch>
+        </p:blipFill>
+        <p:spPr>
+          <a:xfrm>
+            <a:off x="15848773" y="9130808"/>
+            <a:ext cx="6828572" cy="4222056"/>
+          </a:xfrm>
+          <a:prstGeom prst="rect">
+            <a:avLst/>
+          </a:prstGeom>
+          <a:ln w="228600" cap="sq" cmpd="thickThin">
+            <a:solidFill>
+              <a:srgbClr val="FFC000"/>
+            </a:solidFill>
+            <a:prstDash val="solid"/>
+            <a:miter lim="800000"/>
+          </a:ln>
+          <a:effectLst>
+            <a:innerShdw blurRad="76200">
+              <a:srgbClr val="000000"/>
+            </a:innerShdw>
+          </a:effectLst>
+        </p:spPr>
+      </p:pic>
     </p:spTree>
   </p:cSld>
   <p:clrMapOvr>

</xml_diff>